<commit_message>
Added names to user stories
</commit_message>
<xml_diff>
--- a/sem2/Client Meeting Slides/SERP Sem2 Meeting 4.pptx
+++ b/sem2/Client Meeting Slides/SERP Sem2 Meeting 4.pptx
@@ -16664,7 +16664,7 @@
             </a:pPr>
             <a:r>
               <a:rPr lang="en"/>
-              <a:t>User Stories 1 </a:t>
+              <a:t>User Stories - Jared </a:t>
             </a:r>
             <a:endParaRPr/>
           </a:p>
@@ -16680,7 +16680,7 @@
         </p:nvSpPr>
         <p:spPr>
           <a:xfrm>
-            <a:off x="1110425" y="1430100"/>
+            <a:off x="1110425" y="1582500"/>
             <a:ext cx="7224000" cy="3198000"/>
           </a:xfrm>
           <a:prstGeom prst="rect">
@@ -16736,64 +16736,6 @@
                 <a:sym typeface="Arial"/>
               </a:rPr>
               <a:t>(Complete)(2)</a:t>
-            </a:r>
-            <a:endParaRPr b="1" sz="1200">
-              <a:solidFill>
-                <a:srgbClr val="24292E"/>
-              </a:solidFill>
-              <a:highlight>
-                <a:srgbClr val="FFFFFF"/>
-              </a:highlight>
-              <a:latin typeface="Arial"/>
-              <a:ea typeface="Arial"/>
-              <a:cs typeface="Arial"/>
-              <a:sym typeface="Arial"/>
-            </a:endParaRPr>
-          </a:p>
-          <a:p>
-            <a:pPr indent="-304800" lvl="0" marL="457200" rtl="0" algn="l">
-              <a:spcBef>
-                <a:spcPts val="1000"/>
-              </a:spcBef>
-              <a:spcAft>
-                <a:spcPts val="0"/>
-              </a:spcAft>
-              <a:buClr>
-                <a:srgbClr val="24292E"/>
-              </a:buClr>
-              <a:buSzPts val="1200"/>
-              <a:buFont typeface="Arial"/>
-              <a:buAutoNum type="arabicPeriod"/>
-            </a:pPr>
-            <a:r>
-              <a:rPr lang="en" sz="1200">
-                <a:solidFill>
-                  <a:srgbClr val="24292E"/>
-                </a:solidFill>
-                <a:highlight>
-                  <a:srgbClr val="FFFFFF"/>
-                </a:highlight>
-                <a:latin typeface="Arial"/>
-                <a:ea typeface="Arial"/>
-                <a:cs typeface="Arial"/>
-                <a:sym typeface="Arial"/>
-              </a:rPr>
-              <a:t>As a user of the system, I want to be able to manually add tracks that move by clicking a button on the map, so that I can make predictions about a track's course of collision. </a:t>
-            </a:r>
-            <a:r>
-              <a:rPr b="1" lang="en" sz="1200">
-                <a:solidFill>
-                  <a:srgbClr val="24292E"/>
-                </a:solidFill>
-                <a:highlight>
-                  <a:srgbClr val="FFFFFF"/>
-                </a:highlight>
-                <a:latin typeface="Arial"/>
-                <a:ea typeface="Arial"/>
-                <a:cs typeface="Arial"/>
-                <a:sym typeface="Arial"/>
-              </a:rPr>
-              <a:t>(In Progress)(4)</a:t>
             </a:r>
             <a:endParaRPr sz="1200">
               <a:solidFill>
@@ -17116,7 +17058,7 @@
             </a:pPr>
             <a:r>
               <a:rPr lang="en"/>
-              <a:t>User Stories 2</a:t>
+              <a:t>User Stories - Jennifer</a:t>
             </a:r>
             <a:endParaRPr/>
           </a:p>
@@ -17978,7 +17920,7 @@
             </a:pPr>
             <a:r>
               <a:rPr lang="en"/>
-              <a:t>User Stories 3</a:t>
+              <a:t>User Stories - Christian</a:t>
             </a:r>
             <a:endParaRPr/>
           </a:p>

</xml_diff>